<commit_message>
Added GH repo link
</commit_message>
<xml_diff>
--- a/Docs & Presentation/Presentation.pptx
+++ b/Docs & Presentation/Presentation.pptx
@@ -6,7 +6,7 @@
     <p:sldMasterId id="2147483674" r:id="rId2"/>
   </p:sldMasterIdLst>
   <p:notesMasterIdLst>
-    <p:notesMasterId r:id="rId24"/>
+    <p:notesMasterId r:id="rId23"/>
   </p:notesMasterIdLst>
   <p:sldIdLst>
     <p:sldId id="256" r:id="rId3"/>
@@ -21,56 +21,55 @@
     <p:sldId id="307" r:id="rId12"/>
     <p:sldId id="263" r:id="rId13"/>
     <p:sldId id="309" r:id="rId14"/>
-    <p:sldId id="308" r:id="rId15"/>
-    <p:sldId id="310" r:id="rId16"/>
-    <p:sldId id="311" r:id="rId17"/>
-    <p:sldId id="312" r:id="rId18"/>
-    <p:sldId id="264" r:id="rId19"/>
-    <p:sldId id="314" r:id="rId20"/>
-    <p:sldId id="313" r:id="rId21"/>
-    <p:sldId id="315" r:id="rId22"/>
-    <p:sldId id="316" r:id="rId23"/>
+    <p:sldId id="310" r:id="rId15"/>
+    <p:sldId id="311" r:id="rId16"/>
+    <p:sldId id="312" r:id="rId17"/>
+    <p:sldId id="264" r:id="rId18"/>
+    <p:sldId id="314" r:id="rId19"/>
+    <p:sldId id="313" r:id="rId20"/>
+    <p:sldId id="315" r:id="rId21"/>
+    <p:sldId id="316" r:id="rId22"/>
   </p:sldIdLst>
   <p:sldSz cx="9144000" cy="5143500" type="screen16x9"/>
   <p:notesSz cx="6858000" cy="9144000"/>
   <p:embeddedFontLst>
     <p:embeddedFont>
       <p:font typeface="Cambria" panose="02040503050406030204" pitchFamily="18" charset="0"/>
-      <p:regular r:id="rId25"/>
-      <p:bold r:id="rId26"/>
-      <p:italic r:id="rId27"/>
-      <p:boldItalic r:id="rId28"/>
+      <p:regular r:id="rId24"/>
+      <p:bold r:id="rId25"/>
+      <p:italic r:id="rId26"/>
+      <p:boldItalic r:id="rId27"/>
     </p:embeddedFont>
     <p:embeddedFont>
       <p:font typeface="Cambria Math" panose="02040503050406030204" pitchFamily="18" charset="0"/>
+      <p:regular r:id="rId28"/>
+    </p:embeddedFont>
+    <p:embeddedFont>
+      <p:font typeface="Didact Gothic" panose="020B0604020202020204" charset="0"/>
       <p:regular r:id="rId29"/>
     </p:embeddedFont>
     <p:embeddedFont>
-      <p:font typeface="Didact Gothic" panose="020B0604020202020204" charset="0"/>
+      <p:font typeface="Fira Sans Condensed" panose="020B0604020202020204" charset="0"/>
       <p:regular r:id="rId30"/>
-    </p:embeddedFont>
-    <p:embeddedFont>
-      <p:font typeface="Fira Sans Condensed" panose="020B0604020202020204" charset="0"/>
-      <p:regular r:id="rId31"/>
-      <p:bold r:id="rId32"/>
-      <p:italic r:id="rId33"/>
-      <p:boldItalic r:id="rId34"/>
+      <p:bold r:id="rId31"/>
+      <p:italic r:id="rId32"/>
+      <p:boldItalic r:id="rId33"/>
     </p:embeddedFont>
     <p:embeddedFont>
       <p:font typeface="Fira Sans Condensed ExtraBold" panose="020B0604020202020204" charset="0"/>
-      <p:bold r:id="rId35"/>
-      <p:boldItalic r:id="rId36"/>
+      <p:bold r:id="rId34"/>
+      <p:boldItalic r:id="rId35"/>
     </p:embeddedFont>
     <p:embeddedFont>
       <p:font typeface="Muli" panose="020B0604020202020204" charset="0"/>
-      <p:regular r:id="rId37"/>
-      <p:bold r:id="rId38"/>
-      <p:italic r:id="rId39"/>
-      <p:boldItalic r:id="rId40"/>
+      <p:regular r:id="rId36"/>
+      <p:bold r:id="rId37"/>
+      <p:italic r:id="rId38"/>
+      <p:boldItalic r:id="rId39"/>
     </p:embeddedFont>
     <p:embeddedFont>
       <p:font typeface="Righteous" panose="020B0604020202020204" charset="0"/>
-      <p:regular r:id="rId41"/>
+      <p:regular r:id="rId40"/>
     </p:embeddedFont>
   </p:embeddedFontLst>
   <p:defaultTextStyle>
@@ -1276,7 +1275,7 @@
     </p:spTree>
     <p:extLst>
       <p:ext uri="{BB962C8B-B14F-4D97-AF65-F5344CB8AC3E}">
-        <p14:creationId xmlns:p14="http://schemas.microsoft.com/office/powerpoint/2010/main" val="2908071936"/>
+        <p14:creationId xmlns:p14="http://schemas.microsoft.com/office/powerpoint/2010/main" val="1590535801"/>
       </p:ext>
     </p:extLst>
   </p:cSld>
@@ -1385,7 +1384,7 @@
     </p:spTree>
     <p:extLst>
       <p:ext uri="{BB962C8B-B14F-4D97-AF65-F5344CB8AC3E}">
-        <p14:creationId xmlns:p14="http://schemas.microsoft.com/office/powerpoint/2010/main" val="1590535801"/>
+        <p14:creationId xmlns:p14="http://schemas.microsoft.com/office/powerpoint/2010/main" val="3666925154"/>
       </p:ext>
     </p:extLst>
   </p:cSld>
@@ -1396,115 +1395,6 @@
 </file>
 
 <file path=ppt/notesSlides/notesSlide15.xml><?xml version="1.0" encoding="utf-8"?>
-<p:notes xmlns:a="http://schemas.openxmlformats.org/drawingml/2006/main" xmlns:r="http://schemas.openxmlformats.org/officeDocument/2006/relationships" xmlns:p="http://schemas.openxmlformats.org/presentationml/2006/main" showMasterSp="0" showMasterPhAnim="0">
-  <p:cSld>
-    <p:spTree>
-      <p:nvGrpSpPr>
-        <p:cNvPr id="1" name="Shape 264"/>
-        <p:cNvGrpSpPr/>
-        <p:nvPr/>
-      </p:nvGrpSpPr>
-      <p:grpSpPr>
-        <a:xfrm>
-          <a:off x="0" y="0"/>
-          <a:ext cx="0" cy="0"/>
-          <a:chOff x="0" y="0"/>
-          <a:chExt cx="0" cy="0"/>
-        </a:xfrm>
-      </p:grpSpPr>
-      <p:sp>
-        <p:nvSpPr>
-          <p:cNvPr id="265" name="Google Shape;265;g6de048e568_0_15324:notes"/>
-          <p:cNvSpPr>
-            <a:spLocks noGrp="1" noRot="1" noChangeAspect="1"/>
-          </p:cNvSpPr>
-          <p:nvPr>
-            <p:ph type="sldImg" idx="2"/>
-          </p:nvPr>
-        </p:nvSpPr>
-        <p:spPr>
-          <a:xfrm>
-            <a:off x="381000" y="685800"/>
-            <a:ext cx="6096000" cy="3429000"/>
-          </a:xfrm>
-          <a:custGeom>
-            <a:avLst/>
-            <a:gdLst/>
-            <a:ahLst/>
-            <a:cxnLst/>
-            <a:rect l="l" t="t" r="r" b="b"/>
-            <a:pathLst>
-              <a:path w="120000" h="120000" extrusionOk="0">
-                <a:moveTo>
-                  <a:pt x="0" y="0"/>
-                </a:moveTo>
-                <a:lnTo>
-                  <a:pt x="120000" y="0"/>
-                </a:lnTo>
-                <a:lnTo>
-                  <a:pt x="120000" y="120000"/>
-                </a:lnTo>
-                <a:lnTo>
-                  <a:pt x="0" y="120000"/>
-                </a:lnTo>
-                <a:close/>
-              </a:path>
-            </a:pathLst>
-          </a:custGeom>
-        </p:spPr>
-      </p:sp>
-      <p:sp>
-        <p:nvSpPr>
-          <p:cNvPr id="266" name="Google Shape;266;g6de048e568_0_15324:notes"/>
-          <p:cNvSpPr txBox="1">
-            <a:spLocks noGrp="1"/>
-          </p:cNvSpPr>
-          <p:nvPr>
-            <p:ph type="body" idx="1"/>
-          </p:nvPr>
-        </p:nvSpPr>
-        <p:spPr>
-          <a:xfrm>
-            <a:off x="685800" y="4343400"/>
-            <a:ext cx="5486400" cy="4114800"/>
-          </a:xfrm>
-          <a:prstGeom prst="rect">
-            <a:avLst/>
-          </a:prstGeom>
-        </p:spPr>
-        <p:txBody>
-          <a:bodyPr spcFirstLastPara="1" wrap="square" lIns="91425" tIns="91425" rIns="91425" bIns="91425" anchor="t" anchorCtr="0">
-            <a:noAutofit/>
-          </a:bodyPr>
-          <a:lstStyle/>
-          <a:p>
-            <a:pPr marL="0" lvl="0" indent="0" algn="l" rtl="0">
-              <a:spcBef>
-                <a:spcPts val="0"/>
-              </a:spcBef>
-              <a:spcAft>
-                <a:spcPts val="0"/>
-              </a:spcAft>
-              <a:buNone/>
-            </a:pPr>
-            <a:endParaRPr/>
-          </a:p>
-        </p:txBody>
-      </p:sp>
-    </p:spTree>
-    <p:extLst>
-      <p:ext uri="{BB962C8B-B14F-4D97-AF65-F5344CB8AC3E}">
-        <p14:creationId xmlns:p14="http://schemas.microsoft.com/office/powerpoint/2010/main" val="3666925154"/>
-      </p:ext>
-    </p:extLst>
-  </p:cSld>
-  <p:clrMapOvr>
-    <a:masterClrMapping/>
-  </p:clrMapOvr>
-</p:notes>
-</file>
-
-<file path=ppt/notesSlides/notesSlide16.xml><?xml version="1.0" encoding="utf-8"?>
 <p:notes xmlns:a="http://schemas.openxmlformats.org/drawingml/2006/main" xmlns:r="http://schemas.openxmlformats.org/officeDocument/2006/relationships" xmlns:p="http://schemas.openxmlformats.org/presentationml/2006/main" showMasterSp="0" showMasterPhAnim="0">
   <p:cSld>
     <p:spTree>
@@ -1613,7 +1503,7 @@
 </p:notes>
 </file>
 
-<file path=ppt/notesSlides/notesSlide17.xml><?xml version="1.0" encoding="utf-8"?>
+<file path=ppt/notesSlides/notesSlide16.xml><?xml version="1.0" encoding="utf-8"?>
 <p:notes xmlns:a="http://schemas.openxmlformats.org/drawingml/2006/main" xmlns:r="http://schemas.openxmlformats.org/officeDocument/2006/relationships" xmlns:p="http://schemas.openxmlformats.org/presentationml/2006/main" showMasterSp="0" showMasterPhAnim="0">
   <p:cSld>
     <p:spTree>
@@ -1717,7 +1607,7 @@
 </p:notes>
 </file>
 
-<file path=ppt/notesSlides/notesSlide18.xml><?xml version="1.0" encoding="utf-8"?>
+<file path=ppt/notesSlides/notesSlide17.xml><?xml version="1.0" encoding="utf-8"?>
 <p:notes xmlns:a="http://schemas.openxmlformats.org/drawingml/2006/main" xmlns:r="http://schemas.openxmlformats.org/officeDocument/2006/relationships" xmlns:p="http://schemas.openxmlformats.org/presentationml/2006/main" showMasterSp="0" showMasterPhAnim="0">
   <p:cSld>
     <p:spTree>
@@ -1817,6 +1707,115 @@
     <p:extLst>
       <p:ext uri="{BB962C8B-B14F-4D97-AF65-F5344CB8AC3E}">
         <p14:creationId xmlns:p14="http://schemas.microsoft.com/office/powerpoint/2010/main" val="3590294389"/>
+      </p:ext>
+    </p:extLst>
+  </p:cSld>
+  <p:clrMapOvr>
+    <a:masterClrMapping/>
+  </p:clrMapOvr>
+</p:notes>
+</file>
+
+<file path=ppt/notesSlides/notesSlide18.xml><?xml version="1.0" encoding="utf-8"?>
+<p:notes xmlns:a="http://schemas.openxmlformats.org/drawingml/2006/main" xmlns:r="http://schemas.openxmlformats.org/officeDocument/2006/relationships" xmlns:p="http://schemas.openxmlformats.org/presentationml/2006/main" showMasterSp="0" showMasterPhAnim="0">
+  <p:cSld>
+    <p:spTree>
+      <p:nvGrpSpPr>
+        <p:cNvPr id="1" name="Shape 275"/>
+        <p:cNvGrpSpPr/>
+        <p:nvPr/>
+      </p:nvGrpSpPr>
+      <p:grpSpPr>
+        <a:xfrm>
+          <a:off x="0" y="0"/>
+          <a:ext cx="0" cy="0"/>
+          <a:chOff x="0" y="0"/>
+          <a:chExt cx="0" cy="0"/>
+        </a:xfrm>
+      </p:grpSpPr>
+      <p:sp>
+        <p:nvSpPr>
+          <p:cNvPr id="276" name="Google Shape;276;g6de048e568_0_17000:notes"/>
+          <p:cNvSpPr>
+            <a:spLocks noGrp="1" noRot="1" noChangeAspect="1"/>
+          </p:cNvSpPr>
+          <p:nvPr>
+            <p:ph type="sldImg" idx="2"/>
+          </p:nvPr>
+        </p:nvSpPr>
+        <p:spPr>
+          <a:xfrm>
+            <a:off x="381000" y="685800"/>
+            <a:ext cx="6096000" cy="3429000"/>
+          </a:xfrm>
+          <a:custGeom>
+            <a:avLst/>
+            <a:gdLst/>
+            <a:ahLst/>
+            <a:cxnLst/>
+            <a:rect l="l" t="t" r="r" b="b"/>
+            <a:pathLst>
+              <a:path w="120000" h="120000" extrusionOk="0">
+                <a:moveTo>
+                  <a:pt x="0" y="0"/>
+                </a:moveTo>
+                <a:lnTo>
+                  <a:pt x="120000" y="0"/>
+                </a:lnTo>
+                <a:lnTo>
+                  <a:pt x="120000" y="120000"/>
+                </a:lnTo>
+                <a:lnTo>
+                  <a:pt x="0" y="120000"/>
+                </a:lnTo>
+                <a:close/>
+              </a:path>
+            </a:pathLst>
+          </a:custGeom>
+        </p:spPr>
+      </p:sp>
+      <p:sp>
+        <p:nvSpPr>
+          <p:cNvPr id="277" name="Google Shape;277;g6de048e568_0_17000:notes"/>
+          <p:cNvSpPr txBox="1">
+            <a:spLocks noGrp="1"/>
+          </p:cNvSpPr>
+          <p:nvPr>
+            <p:ph type="body" idx="1"/>
+          </p:nvPr>
+        </p:nvSpPr>
+        <p:spPr>
+          <a:xfrm>
+            <a:off x="685800" y="4343400"/>
+            <a:ext cx="5486400" cy="4114800"/>
+          </a:xfrm>
+          <a:prstGeom prst="rect">
+            <a:avLst/>
+          </a:prstGeom>
+        </p:spPr>
+        <p:txBody>
+          <a:bodyPr spcFirstLastPara="1" wrap="square" lIns="91425" tIns="91425" rIns="91425" bIns="91425" anchor="t" anchorCtr="0">
+            <a:noAutofit/>
+          </a:bodyPr>
+          <a:lstStyle/>
+          <a:p>
+            <a:pPr marL="0" lvl="0" indent="0" algn="l" rtl="0">
+              <a:spcBef>
+                <a:spcPts val="0"/>
+              </a:spcBef>
+              <a:spcAft>
+                <a:spcPts val="0"/>
+              </a:spcAft>
+              <a:buNone/>
+            </a:pPr>
+            <a:endParaRPr/>
+          </a:p>
+        </p:txBody>
+      </p:sp>
+    </p:spTree>
+    <p:extLst>
+      <p:ext uri="{BB962C8B-B14F-4D97-AF65-F5344CB8AC3E}">
+        <p14:creationId xmlns:p14="http://schemas.microsoft.com/office/powerpoint/2010/main" val="1643268442"/>
       </p:ext>
     </p:extLst>
   </p:cSld>
@@ -1925,7 +1924,7 @@
     </p:spTree>
     <p:extLst>
       <p:ext uri="{BB962C8B-B14F-4D97-AF65-F5344CB8AC3E}">
-        <p14:creationId xmlns:p14="http://schemas.microsoft.com/office/powerpoint/2010/main" val="1643268442"/>
+        <p14:creationId xmlns:p14="http://schemas.microsoft.com/office/powerpoint/2010/main" val="2187936220"/>
       </p:ext>
     </p:extLst>
   </p:cSld>
@@ -2040,115 +2039,6 @@
 </file>
 
 <file path=ppt/notesSlides/notesSlide20.xml><?xml version="1.0" encoding="utf-8"?>
-<p:notes xmlns:a="http://schemas.openxmlformats.org/drawingml/2006/main" xmlns:r="http://schemas.openxmlformats.org/officeDocument/2006/relationships" xmlns:p="http://schemas.openxmlformats.org/presentationml/2006/main" showMasterSp="0" showMasterPhAnim="0">
-  <p:cSld>
-    <p:spTree>
-      <p:nvGrpSpPr>
-        <p:cNvPr id="1" name="Shape 275"/>
-        <p:cNvGrpSpPr/>
-        <p:nvPr/>
-      </p:nvGrpSpPr>
-      <p:grpSpPr>
-        <a:xfrm>
-          <a:off x="0" y="0"/>
-          <a:ext cx="0" cy="0"/>
-          <a:chOff x="0" y="0"/>
-          <a:chExt cx="0" cy="0"/>
-        </a:xfrm>
-      </p:grpSpPr>
-      <p:sp>
-        <p:nvSpPr>
-          <p:cNvPr id="276" name="Google Shape;276;g6de048e568_0_17000:notes"/>
-          <p:cNvSpPr>
-            <a:spLocks noGrp="1" noRot="1" noChangeAspect="1"/>
-          </p:cNvSpPr>
-          <p:nvPr>
-            <p:ph type="sldImg" idx="2"/>
-          </p:nvPr>
-        </p:nvSpPr>
-        <p:spPr>
-          <a:xfrm>
-            <a:off x="381000" y="685800"/>
-            <a:ext cx="6096000" cy="3429000"/>
-          </a:xfrm>
-          <a:custGeom>
-            <a:avLst/>
-            <a:gdLst/>
-            <a:ahLst/>
-            <a:cxnLst/>
-            <a:rect l="l" t="t" r="r" b="b"/>
-            <a:pathLst>
-              <a:path w="120000" h="120000" extrusionOk="0">
-                <a:moveTo>
-                  <a:pt x="0" y="0"/>
-                </a:moveTo>
-                <a:lnTo>
-                  <a:pt x="120000" y="0"/>
-                </a:lnTo>
-                <a:lnTo>
-                  <a:pt x="120000" y="120000"/>
-                </a:lnTo>
-                <a:lnTo>
-                  <a:pt x="0" y="120000"/>
-                </a:lnTo>
-                <a:close/>
-              </a:path>
-            </a:pathLst>
-          </a:custGeom>
-        </p:spPr>
-      </p:sp>
-      <p:sp>
-        <p:nvSpPr>
-          <p:cNvPr id="277" name="Google Shape;277;g6de048e568_0_17000:notes"/>
-          <p:cNvSpPr txBox="1">
-            <a:spLocks noGrp="1"/>
-          </p:cNvSpPr>
-          <p:nvPr>
-            <p:ph type="body" idx="1"/>
-          </p:nvPr>
-        </p:nvSpPr>
-        <p:spPr>
-          <a:xfrm>
-            <a:off x="685800" y="4343400"/>
-            <a:ext cx="5486400" cy="4114800"/>
-          </a:xfrm>
-          <a:prstGeom prst="rect">
-            <a:avLst/>
-          </a:prstGeom>
-        </p:spPr>
-        <p:txBody>
-          <a:bodyPr spcFirstLastPara="1" wrap="square" lIns="91425" tIns="91425" rIns="91425" bIns="91425" anchor="t" anchorCtr="0">
-            <a:noAutofit/>
-          </a:bodyPr>
-          <a:lstStyle/>
-          <a:p>
-            <a:pPr marL="0" lvl="0" indent="0" algn="l" rtl="0">
-              <a:spcBef>
-                <a:spcPts val="0"/>
-              </a:spcBef>
-              <a:spcAft>
-                <a:spcPts val="0"/>
-              </a:spcAft>
-              <a:buNone/>
-            </a:pPr>
-            <a:endParaRPr/>
-          </a:p>
-        </p:txBody>
-      </p:sp>
-    </p:spTree>
-    <p:extLst>
-      <p:ext uri="{BB962C8B-B14F-4D97-AF65-F5344CB8AC3E}">
-        <p14:creationId xmlns:p14="http://schemas.microsoft.com/office/powerpoint/2010/main" val="2187936220"/>
-      </p:ext>
-    </p:extLst>
-  </p:cSld>
-  <p:clrMapOvr>
-    <a:masterClrMapping/>
-  </p:clrMapOvr>
-</p:notes>
-</file>
-
-<file path=ppt/notesSlides/notesSlide21.xml><?xml version="1.0" encoding="utf-8"?>
 <p:notes xmlns:a="http://schemas.openxmlformats.org/drawingml/2006/main" xmlns:r="http://schemas.openxmlformats.org/officeDocument/2006/relationships" xmlns:p="http://schemas.openxmlformats.org/presentationml/2006/main" showMasterSp="0" showMasterPhAnim="0">
   <p:cSld>
     <p:spTree>
@@ -28431,6 +28321,309 @@
           </p:txBody>
         </p:sp>
       </p:grpSp>
+      <p:sp>
+        <p:nvSpPr>
+          <p:cNvPr id="10" name="Google Shape;168;p31">
+            <a:extLst>
+              <a:ext uri="{FF2B5EF4-FFF2-40B4-BE49-F238E27FC236}">
+                <a16:creationId xmlns:a16="http://schemas.microsoft.com/office/drawing/2014/main" id="{286F0744-1A79-4F51-8E1A-D045305D9849}"/>
+              </a:ext>
+            </a:extLst>
+          </p:cNvPr>
+          <p:cNvSpPr txBox="1">
+            <a:spLocks/>
+          </p:cNvSpPr>
+          <p:nvPr/>
+        </p:nvSpPr>
+        <p:spPr>
+          <a:xfrm>
+            <a:off x="858465" y="4110507"/>
+            <a:ext cx="7734980" cy="495148"/>
+          </a:xfrm>
+          <a:prstGeom prst="rect">
+            <a:avLst/>
+          </a:prstGeom>
+          <a:noFill/>
+          <a:ln>
+            <a:noFill/>
+          </a:ln>
+        </p:spPr>
+        <p:txBody>
+          <a:bodyPr spcFirstLastPara="1" wrap="square" lIns="91425" tIns="91425" rIns="91425" bIns="91425" anchor="t" anchorCtr="0">
+            <a:noAutofit/>
+          </a:bodyPr>
+          <a:lstStyle>
+            <a:defPPr marR="0" lvl="0" algn="l" rtl="0">
+              <a:lnSpc>
+                <a:spcPct val="100000"/>
+              </a:lnSpc>
+              <a:spcBef>
+                <a:spcPts val="0"/>
+              </a:spcBef>
+              <a:spcAft>
+                <a:spcPts val="0"/>
+              </a:spcAft>
+            </a:defPPr>
+            <a:lvl1pPr marL="457200" marR="0" lvl="0" indent="-342900" algn="ctr" rtl="0">
+              <a:lnSpc>
+                <a:spcPct val="100000"/>
+              </a:lnSpc>
+              <a:spcBef>
+                <a:spcPts val="0"/>
+              </a:spcBef>
+              <a:spcAft>
+                <a:spcPts val="0"/>
+              </a:spcAft>
+              <a:buClr>
+                <a:schemeClr val="accent2"/>
+              </a:buClr>
+              <a:buSzPts val="1800"/>
+              <a:buFont typeface="Fira Sans Condensed"/>
+              <a:buNone/>
+              <a:defRPr sz="1800" b="0" i="0" u="none" strike="noStrike" cap="none">
+                <a:solidFill>
+                  <a:schemeClr val="accent2"/>
+                </a:solidFill>
+                <a:latin typeface="Fira Sans Condensed"/>
+                <a:ea typeface="Fira Sans Condensed"/>
+                <a:cs typeface="Fira Sans Condensed"/>
+                <a:sym typeface="Fira Sans Condensed"/>
+              </a:defRPr>
+            </a:lvl1pPr>
+            <a:lvl2pPr marL="914400" marR="0" lvl="1" indent="-317500" algn="ctr" rtl="0">
+              <a:lnSpc>
+                <a:spcPct val="100000"/>
+              </a:lnSpc>
+              <a:spcBef>
+                <a:spcPts val="0"/>
+              </a:spcBef>
+              <a:spcAft>
+                <a:spcPts val="0"/>
+              </a:spcAft>
+              <a:buClr>
+                <a:schemeClr val="accent2"/>
+              </a:buClr>
+              <a:buSzPts val="2800"/>
+              <a:buFont typeface="Fira Sans Condensed"/>
+              <a:buNone/>
+              <a:defRPr sz="2800" b="0" i="0" u="none" strike="noStrike" cap="none">
+                <a:solidFill>
+                  <a:schemeClr val="accent2"/>
+                </a:solidFill>
+                <a:latin typeface="Fira Sans Condensed"/>
+                <a:ea typeface="Fira Sans Condensed"/>
+                <a:cs typeface="Fira Sans Condensed"/>
+                <a:sym typeface="Fira Sans Condensed"/>
+              </a:defRPr>
+            </a:lvl2pPr>
+            <a:lvl3pPr marL="1371600" marR="0" lvl="2" indent="-317500" algn="ctr" rtl="0">
+              <a:lnSpc>
+                <a:spcPct val="100000"/>
+              </a:lnSpc>
+              <a:spcBef>
+                <a:spcPts val="0"/>
+              </a:spcBef>
+              <a:spcAft>
+                <a:spcPts val="0"/>
+              </a:spcAft>
+              <a:buClr>
+                <a:schemeClr val="accent2"/>
+              </a:buClr>
+              <a:buSzPts val="2800"/>
+              <a:buFont typeface="Fira Sans Condensed"/>
+              <a:buNone/>
+              <a:defRPr sz="2800" b="0" i="0" u="none" strike="noStrike" cap="none">
+                <a:solidFill>
+                  <a:schemeClr val="accent2"/>
+                </a:solidFill>
+                <a:latin typeface="Fira Sans Condensed"/>
+                <a:ea typeface="Fira Sans Condensed"/>
+                <a:cs typeface="Fira Sans Condensed"/>
+                <a:sym typeface="Fira Sans Condensed"/>
+              </a:defRPr>
+            </a:lvl3pPr>
+            <a:lvl4pPr marL="1828800" marR="0" lvl="3" indent="-317500" algn="ctr" rtl="0">
+              <a:lnSpc>
+                <a:spcPct val="100000"/>
+              </a:lnSpc>
+              <a:spcBef>
+                <a:spcPts val="0"/>
+              </a:spcBef>
+              <a:spcAft>
+                <a:spcPts val="0"/>
+              </a:spcAft>
+              <a:buClr>
+                <a:schemeClr val="accent2"/>
+              </a:buClr>
+              <a:buSzPts val="2800"/>
+              <a:buFont typeface="Fira Sans Condensed"/>
+              <a:buNone/>
+              <a:defRPr sz="2800" b="0" i="0" u="none" strike="noStrike" cap="none">
+                <a:solidFill>
+                  <a:schemeClr val="accent2"/>
+                </a:solidFill>
+                <a:latin typeface="Fira Sans Condensed"/>
+                <a:ea typeface="Fira Sans Condensed"/>
+                <a:cs typeface="Fira Sans Condensed"/>
+                <a:sym typeface="Fira Sans Condensed"/>
+              </a:defRPr>
+            </a:lvl4pPr>
+            <a:lvl5pPr marL="2286000" marR="0" lvl="4" indent="-317500" algn="ctr" rtl="0">
+              <a:lnSpc>
+                <a:spcPct val="100000"/>
+              </a:lnSpc>
+              <a:spcBef>
+                <a:spcPts val="0"/>
+              </a:spcBef>
+              <a:spcAft>
+                <a:spcPts val="0"/>
+              </a:spcAft>
+              <a:buClr>
+                <a:schemeClr val="accent2"/>
+              </a:buClr>
+              <a:buSzPts val="2800"/>
+              <a:buFont typeface="Fira Sans Condensed"/>
+              <a:buNone/>
+              <a:defRPr sz="2800" b="0" i="0" u="none" strike="noStrike" cap="none">
+                <a:solidFill>
+                  <a:schemeClr val="accent2"/>
+                </a:solidFill>
+                <a:latin typeface="Fira Sans Condensed"/>
+                <a:ea typeface="Fira Sans Condensed"/>
+                <a:cs typeface="Fira Sans Condensed"/>
+                <a:sym typeface="Fira Sans Condensed"/>
+              </a:defRPr>
+            </a:lvl5pPr>
+            <a:lvl6pPr marL="2743200" marR="0" lvl="5" indent="-317500" algn="ctr" rtl="0">
+              <a:lnSpc>
+                <a:spcPct val="100000"/>
+              </a:lnSpc>
+              <a:spcBef>
+                <a:spcPts val="0"/>
+              </a:spcBef>
+              <a:spcAft>
+                <a:spcPts val="0"/>
+              </a:spcAft>
+              <a:buClr>
+                <a:schemeClr val="accent2"/>
+              </a:buClr>
+              <a:buSzPts val="2800"/>
+              <a:buFont typeface="Fira Sans Condensed"/>
+              <a:buNone/>
+              <a:defRPr sz="2800" b="0" i="0" u="none" strike="noStrike" cap="none">
+                <a:solidFill>
+                  <a:schemeClr val="accent2"/>
+                </a:solidFill>
+                <a:latin typeface="Fira Sans Condensed"/>
+                <a:ea typeface="Fira Sans Condensed"/>
+                <a:cs typeface="Fira Sans Condensed"/>
+                <a:sym typeface="Fira Sans Condensed"/>
+              </a:defRPr>
+            </a:lvl6pPr>
+            <a:lvl7pPr marL="3200400" marR="0" lvl="6" indent="-317500" algn="ctr" rtl="0">
+              <a:lnSpc>
+                <a:spcPct val="100000"/>
+              </a:lnSpc>
+              <a:spcBef>
+                <a:spcPts val="0"/>
+              </a:spcBef>
+              <a:spcAft>
+                <a:spcPts val="0"/>
+              </a:spcAft>
+              <a:buClr>
+                <a:schemeClr val="accent2"/>
+              </a:buClr>
+              <a:buSzPts val="2800"/>
+              <a:buFont typeface="Fira Sans Condensed"/>
+              <a:buNone/>
+              <a:defRPr sz="2800" b="0" i="0" u="none" strike="noStrike" cap="none">
+                <a:solidFill>
+                  <a:schemeClr val="accent2"/>
+                </a:solidFill>
+                <a:latin typeface="Fira Sans Condensed"/>
+                <a:ea typeface="Fira Sans Condensed"/>
+                <a:cs typeface="Fira Sans Condensed"/>
+                <a:sym typeface="Fira Sans Condensed"/>
+              </a:defRPr>
+            </a:lvl7pPr>
+            <a:lvl8pPr marL="3657600" marR="0" lvl="7" indent="-317500" algn="ctr" rtl="0">
+              <a:lnSpc>
+                <a:spcPct val="100000"/>
+              </a:lnSpc>
+              <a:spcBef>
+                <a:spcPts val="0"/>
+              </a:spcBef>
+              <a:spcAft>
+                <a:spcPts val="0"/>
+              </a:spcAft>
+              <a:buClr>
+                <a:schemeClr val="accent2"/>
+              </a:buClr>
+              <a:buSzPts val="2800"/>
+              <a:buFont typeface="Fira Sans Condensed"/>
+              <a:buNone/>
+              <a:defRPr sz="2800" b="0" i="0" u="none" strike="noStrike" cap="none">
+                <a:solidFill>
+                  <a:schemeClr val="accent2"/>
+                </a:solidFill>
+                <a:latin typeface="Fira Sans Condensed"/>
+                <a:ea typeface="Fira Sans Condensed"/>
+                <a:cs typeface="Fira Sans Condensed"/>
+                <a:sym typeface="Fira Sans Condensed"/>
+              </a:defRPr>
+            </a:lvl8pPr>
+            <a:lvl9pPr marL="4114800" marR="0" lvl="8" indent="-317500" algn="ctr" rtl="0">
+              <a:lnSpc>
+                <a:spcPct val="100000"/>
+              </a:lnSpc>
+              <a:spcBef>
+                <a:spcPts val="0"/>
+              </a:spcBef>
+              <a:spcAft>
+                <a:spcPts val="0"/>
+              </a:spcAft>
+              <a:buClr>
+                <a:schemeClr val="accent2"/>
+              </a:buClr>
+              <a:buSzPts val="2800"/>
+              <a:buFont typeface="Fira Sans Condensed"/>
+              <a:buNone/>
+              <a:defRPr sz="2800" b="0" i="0" u="none" strike="noStrike" cap="none">
+                <a:solidFill>
+                  <a:schemeClr val="accent2"/>
+                </a:solidFill>
+                <a:latin typeface="Fira Sans Condensed"/>
+                <a:ea typeface="Fira Sans Condensed"/>
+                <a:cs typeface="Fira Sans Condensed"/>
+                <a:sym typeface="Fira Sans Condensed"/>
+              </a:defRPr>
+            </a:lvl9pPr>
+          </a:lstStyle>
+          <a:p>
+            <a:pPr marL="0" indent="0"/>
+            <a:r>
+              <a:rPr lang="en-US" dirty="0">
+                <a:latin typeface="Cambria" panose="02040503050406030204" pitchFamily="18" charset="0"/>
+                <a:ea typeface="Cambria" panose="02040503050406030204" pitchFamily="18" charset="0"/>
+              </a:rPr>
+              <a:t>GitHub Repo: </a:t>
+            </a:r>
+            <a:r>
+              <a:rPr lang="en-US" dirty="0">
+                <a:hlinkClick r:id="rId4"/>
+              </a:rPr>
+              <a:t>https://github.com/Oschart/Embedded-Heart-Monitor</a:t>
+            </a:r>
+            <a:endParaRPr lang="en-US" dirty="0">
+              <a:solidFill>
+                <a:srgbClr val="0070C0"/>
+              </a:solidFill>
+              <a:latin typeface="Cambria" panose="02040503050406030204" pitchFamily="18" charset="0"/>
+              <a:ea typeface="Cambria" panose="02040503050406030204" pitchFamily="18" charset="0"/>
+            </a:endParaRPr>
+          </a:p>
+        </p:txBody>
+      </p:sp>
     </p:spTree>
   </p:cSld>
   <p:clrMapOvr>
@@ -29060,8 +29253,8 @@
           </a:p>
         </p:txBody>
       </p:sp>
-      <mc:AlternateContent xmlns:mc="http://schemas.openxmlformats.org/markup-compatibility/2006">
-        <mc:Choice xmlns:a14="http://schemas.microsoft.com/office/drawing/2010/main" Requires="a14">
+      <mc:AlternateContent xmlns:mc="http://schemas.openxmlformats.org/markup-compatibility/2006" xmlns:a14="http://schemas.microsoft.com/office/drawing/2010/main">
+        <mc:Choice Requires="a14">
           <p:sp>
             <p:nvSpPr>
               <p:cNvPr id="271" name="Google Shape;271;p34"/>
@@ -29309,7 +29502,7 @@
             </p:txBody>
           </p:sp>
         </mc:Choice>
-        <mc:Fallback>
+        <mc:Fallback xmlns="">
           <p:sp>
             <p:nvSpPr>
               <p:cNvPr id="271" name="Google Shape;271;p34"/>
@@ -29638,319 +29831,6 @@
             </a:pPr>
             <a:r>
               <a:rPr lang="en-US" dirty="0"/>
-              <a:t>ARR is fixed at 60000-1</a:t>
-            </a:r>
-          </a:p>
-          <a:p>
-            <a:pPr marL="457200" lvl="0" indent="-317500" algn="l" rtl="0">
-              <a:lnSpc>
-                <a:spcPct val="150000"/>
-              </a:lnSpc>
-              <a:spcBef>
-                <a:spcPts val="0"/>
-              </a:spcBef>
-              <a:spcAft>
-                <a:spcPts val="0"/>
-              </a:spcAft>
-              <a:buSzPts val="1400"/>
-              <a:buChar char="●"/>
-            </a:pPr>
-            <a:r>
-              <a:rPr lang="en-US" dirty="0"/>
-              <a:t>The C1MWD command triggers the data collection mode and starts TIM2 for sampling</a:t>
-            </a:r>
-            <a:endParaRPr dirty="0"/>
-          </a:p>
-        </p:txBody>
-      </p:sp>
-      <p:sp>
-        <p:nvSpPr>
-          <p:cNvPr id="272" name="Google Shape;272;p34"/>
-          <p:cNvSpPr txBox="1">
-            <a:spLocks noGrp="1"/>
-          </p:cNvSpPr>
-          <p:nvPr>
-            <p:ph type="title"/>
-          </p:nvPr>
-        </p:nvSpPr>
-        <p:spPr>
-          <a:xfrm>
-            <a:off x="1068300" y="313350"/>
-            <a:ext cx="7007400" cy="572700"/>
-          </a:xfrm>
-          <a:prstGeom prst="rect">
-            <a:avLst/>
-          </a:prstGeom>
-        </p:spPr>
-        <p:txBody>
-          <a:bodyPr spcFirstLastPara="1" wrap="square" lIns="91425" tIns="91425" rIns="91425" bIns="91425" anchor="t" anchorCtr="0">
-            <a:noAutofit/>
-          </a:bodyPr>
-          <a:lstStyle/>
-          <a:p>
-            <a:pPr lvl="0"/>
-            <a:r>
-              <a:rPr lang="en-US" dirty="0"/>
-              <a:t>Implementation (cont.)</a:t>
-            </a:r>
-            <a:endParaRPr dirty="0"/>
-          </a:p>
-        </p:txBody>
-      </p:sp>
-      <p:pic>
-        <p:nvPicPr>
-          <p:cNvPr id="5" name="Picture 4">
-            <a:extLst>
-              <a:ext uri="{FF2B5EF4-FFF2-40B4-BE49-F238E27FC236}">
-                <a16:creationId xmlns:a16="http://schemas.microsoft.com/office/drawing/2014/main" id="{885461D7-425C-40D3-A958-84E3BCDCFFB2}"/>
-              </a:ext>
-            </a:extLst>
-          </p:cNvPr>
-          <p:cNvPicPr>
-            <a:picLocks noChangeAspect="1"/>
-          </p:cNvPicPr>
-          <p:nvPr/>
-        </p:nvPicPr>
-        <p:blipFill>
-          <a:blip r:embed="rId3"/>
-          <a:stretch>
-            <a:fillRect/>
-          </a:stretch>
-        </p:blipFill>
-        <p:spPr>
-          <a:xfrm>
-            <a:off x="5691034" y="1115865"/>
-            <a:ext cx="3338513" cy="2185988"/>
-          </a:xfrm>
-          <a:prstGeom prst="rect">
-            <a:avLst/>
-          </a:prstGeom>
-        </p:spPr>
-      </p:pic>
-    </p:spTree>
-    <p:extLst>
-      <p:ext uri="{BB962C8B-B14F-4D97-AF65-F5344CB8AC3E}">
-        <p14:creationId xmlns:p14="http://schemas.microsoft.com/office/powerpoint/2010/main" val="26756131"/>
-      </p:ext>
-    </p:extLst>
-  </p:cSld>
-  <p:clrMapOvr>
-    <a:masterClrMapping/>
-  </p:clrMapOvr>
-</p:sld>
-</file>
-
-<file path=ppt/slides/slide14.xml><?xml version="1.0" encoding="utf-8"?>
-<p:sld xmlns:a="http://schemas.openxmlformats.org/drawingml/2006/main" xmlns:r="http://schemas.openxmlformats.org/officeDocument/2006/relationships" xmlns:p="http://schemas.openxmlformats.org/presentationml/2006/main">
-  <p:cSld>
-    <p:spTree>
-      <p:nvGrpSpPr>
-        <p:cNvPr id="1" name="Shape 267"/>
-        <p:cNvGrpSpPr/>
-        <p:nvPr/>
-      </p:nvGrpSpPr>
-      <p:grpSpPr>
-        <a:xfrm>
-          <a:off x="0" y="0"/>
-          <a:ext cx="0" cy="0"/>
-          <a:chOff x="0" y="0"/>
-          <a:chExt cx="0" cy="0"/>
-        </a:xfrm>
-      </p:grpSpPr>
-      <p:sp>
-        <p:nvSpPr>
-          <p:cNvPr id="268" name="Google Shape;268;p34"/>
-          <p:cNvSpPr txBox="1">
-            <a:spLocks noGrp="1"/>
-          </p:cNvSpPr>
-          <p:nvPr>
-            <p:ph type="subTitle" idx="1"/>
-          </p:nvPr>
-        </p:nvSpPr>
-        <p:spPr>
-          <a:xfrm>
-            <a:off x="389844" y="1055482"/>
-            <a:ext cx="2390100" cy="406385"/>
-          </a:xfrm>
-          <a:prstGeom prst="rect">
-            <a:avLst/>
-          </a:prstGeom>
-        </p:spPr>
-        <p:txBody>
-          <a:bodyPr spcFirstLastPara="1" wrap="square" lIns="91425" tIns="91425" rIns="91425" bIns="91425" anchor="b" anchorCtr="0">
-            <a:noAutofit/>
-          </a:bodyPr>
-          <a:lstStyle/>
-          <a:p>
-            <a:pPr marL="0" lvl="0" indent="0" algn="l" rtl="0">
-              <a:spcBef>
-                <a:spcPts val="0"/>
-              </a:spcBef>
-              <a:spcAft>
-                <a:spcPts val="0"/>
-              </a:spcAft>
-              <a:buNone/>
-            </a:pPr>
-            <a:r>
-              <a:rPr lang="en" dirty="0"/>
-              <a:t>3. </a:t>
-            </a:r>
-            <a:r>
-              <a:rPr lang="en-US" dirty="0"/>
-              <a:t>ECG Data Collection:</a:t>
-            </a:r>
-            <a:endParaRPr dirty="0"/>
-          </a:p>
-        </p:txBody>
-      </p:sp>
-      <p:sp>
-        <p:nvSpPr>
-          <p:cNvPr id="270" name="Google Shape;270;p34"/>
-          <p:cNvSpPr/>
-          <p:nvPr/>
-        </p:nvSpPr>
-        <p:spPr>
-          <a:xfrm>
-            <a:off x="5041075" y="1499275"/>
-            <a:ext cx="3875100" cy="3005400"/>
-          </a:xfrm>
-          <a:prstGeom prst="rect">
-            <a:avLst/>
-          </a:prstGeom>
-          <a:noFill/>
-          <a:ln w="19050" cap="flat" cmpd="sng">
-            <a:solidFill>
-              <a:schemeClr val="lt1"/>
-            </a:solidFill>
-            <a:prstDash val="solid"/>
-            <a:round/>
-            <a:headEnd type="none" w="sm" len="sm"/>
-            <a:tailEnd type="none" w="sm" len="sm"/>
-          </a:ln>
-        </p:spPr>
-        <p:txBody>
-          <a:bodyPr spcFirstLastPara="1" wrap="square" lIns="91425" tIns="91425" rIns="91425" bIns="91425" anchor="ctr" anchorCtr="0">
-            <a:noAutofit/>
-          </a:bodyPr>
-          <a:lstStyle/>
-          <a:p>
-            <a:pPr marL="0" lvl="0" indent="0" algn="l" rtl="0">
-              <a:spcBef>
-                <a:spcPts val="0"/>
-              </a:spcBef>
-              <a:spcAft>
-                <a:spcPts val="0"/>
-              </a:spcAft>
-              <a:buNone/>
-            </a:pPr>
-            <a:endParaRPr/>
-          </a:p>
-        </p:txBody>
-      </p:sp>
-      <p:sp>
-        <p:nvSpPr>
-          <p:cNvPr id="271" name="Google Shape;271;p34"/>
-          <p:cNvSpPr txBox="1">
-            <a:spLocks noGrp="1"/>
-          </p:cNvSpPr>
-          <p:nvPr>
-            <p:ph type="body" idx="2"/>
-          </p:nvPr>
-        </p:nvSpPr>
-        <p:spPr>
-          <a:xfrm>
-            <a:off x="460728" y="1631299"/>
-            <a:ext cx="4919346" cy="2699696"/>
-          </a:xfrm>
-          <a:prstGeom prst="rect">
-            <a:avLst/>
-          </a:prstGeom>
-        </p:spPr>
-        <p:txBody>
-          <a:bodyPr spcFirstLastPara="1" wrap="square" lIns="91425" tIns="91425" rIns="91425" bIns="91425" anchor="t" anchorCtr="0">
-            <a:noAutofit/>
-          </a:bodyPr>
-          <a:lstStyle/>
-          <a:p>
-            <a:pPr marL="457200" lvl="0" indent="-317500" algn="l" rtl="0">
-              <a:lnSpc>
-                <a:spcPct val="150000"/>
-              </a:lnSpc>
-              <a:spcBef>
-                <a:spcPts val="0"/>
-              </a:spcBef>
-              <a:spcAft>
-                <a:spcPts val="0"/>
-              </a:spcAft>
-              <a:buSzPts val="1400"/>
-              <a:buChar char="●"/>
-            </a:pPr>
-            <a:r>
-              <a:rPr lang="en-US" dirty="0"/>
-              <a:t>Done via the C1MWD command</a:t>
-            </a:r>
-          </a:p>
-          <a:p>
-            <a:pPr marL="457200" lvl="0" indent="-317500" algn="l" rtl="0">
-              <a:lnSpc>
-                <a:spcPct val="150000"/>
-              </a:lnSpc>
-              <a:spcBef>
-                <a:spcPts val="0"/>
-              </a:spcBef>
-              <a:spcAft>
-                <a:spcPts val="0"/>
-              </a:spcAft>
-              <a:buSzPts val="1400"/>
-              <a:buChar char="●"/>
-            </a:pPr>
-            <a:r>
-              <a:rPr lang="en-US" dirty="0"/>
-              <a:t>The 1 minute is marked through the TIM ISR callback.</a:t>
-            </a:r>
-          </a:p>
-          <a:p>
-            <a:pPr lvl="0">
-              <a:lnSpc>
-                <a:spcPct val="150000"/>
-              </a:lnSpc>
-            </a:pPr>
-            <a:r>
-              <a:rPr lang="en-US" dirty="0"/>
-              <a:t>GPTIM3 source clock = 8 MHz</a:t>
-            </a:r>
-          </a:p>
-          <a:p>
-            <a:pPr>
-              <a:lnSpc>
-                <a:spcPct val="150000"/>
-              </a:lnSpc>
-            </a:pPr>
-            <a:r>
-              <a:rPr lang="en-US" dirty="0" err="1"/>
-              <a:t>Prescaler</a:t>
-            </a:r>
-            <a:r>
-              <a:rPr lang="en-US" dirty="0"/>
-              <a:t> value is fixed at 8000-1</a:t>
-            </a:r>
-          </a:p>
-          <a:p>
-            <a:pPr marL="457200" lvl="0" indent="-317500" algn="l" rtl="0">
-              <a:lnSpc>
-                <a:spcPct val="150000"/>
-              </a:lnSpc>
-              <a:spcBef>
-                <a:spcPts val="0"/>
-              </a:spcBef>
-              <a:spcAft>
-                <a:spcPts val="0"/>
-              </a:spcAft>
-              <a:buSzPts val="1400"/>
-              <a:buChar char="●"/>
-            </a:pPr>
-            <a:r>
-              <a:rPr lang="en-US" dirty="0"/>
               <a:t>ARR is fixed at 60000-1 to get a minute timer</a:t>
             </a:r>
           </a:p>
@@ -30053,7 +29933,7 @@
 </p:sld>
 </file>
 
-<file path=ppt/slides/slide15.xml><?xml version="1.0" encoding="utf-8"?>
+<file path=ppt/slides/slide14.xml><?xml version="1.0" encoding="utf-8"?>
 <p:sld xmlns:a="http://schemas.openxmlformats.org/drawingml/2006/main" xmlns:r="http://schemas.openxmlformats.org/officeDocument/2006/relationships" xmlns:p="http://schemas.openxmlformats.org/presentationml/2006/main">
   <p:cSld>
     <p:spTree>
@@ -30160,8 +30040,8 @@
           </a:p>
         </p:txBody>
       </p:sp>
-      <mc:AlternateContent xmlns:mc="http://schemas.openxmlformats.org/markup-compatibility/2006">
-        <mc:Choice xmlns:a14="http://schemas.microsoft.com/office/drawing/2010/main" Requires="a14">
+      <mc:AlternateContent xmlns:mc="http://schemas.openxmlformats.org/markup-compatibility/2006" xmlns:a14="http://schemas.microsoft.com/office/drawing/2010/main">
+        <mc:Choice Requires="a14">
           <p:sp>
             <p:nvSpPr>
               <p:cNvPr id="271" name="Google Shape;271;p34"/>
@@ -30349,7 +30229,7 @@
             </p:txBody>
           </p:sp>
         </mc:Choice>
-        <mc:Fallback>
+        <mc:Fallback xmlns="">
           <p:sp>
             <p:nvSpPr>
               <p:cNvPr id="271" name="Google Shape;271;p34"/>
@@ -30467,7 +30347,7 @@
 </p:sld>
 </file>
 
-<file path=ppt/slides/slide16.xml><?xml version="1.0" encoding="utf-8"?>
+<file path=ppt/slides/slide15.xml><?xml version="1.0" encoding="utf-8"?>
 <p:sld xmlns:a="http://schemas.openxmlformats.org/drawingml/2006/main" xmlns:r="http://schemas.openxmlformats.org/officeDocument/2006/relationships" xmlns:p="http://schemas.openxmlformats.org/presentationml/2006/main">
   <p:cSld>
     <p:spTree>
@@ -30699,7 +30579,7 @@
 </p:sld>
 </file>
 
-<file path=ppt/slides/slide17.xml><?xml version="1.0" encoding="utf-8"?>
+<file path=ppt/slides/slide16.xml><?xml version="1.0" encoding="utf-8"?>
 <p:sld xmlns:a="http://schemas.openxmlformats.org/drawingml/2006/main" xmlns:r="http://schemas.openxmlformats.org/officeDocument/2006/relationships" xmlns:p="http://schemas.openxmlformats.org/presentationml/2006/main">
   <p:cSld>
     <p:spTree>
@@ -31485,7 +31365,7 @@
 </p:sld>
 </file>
 
-<file path=ppt/slides/slide18.xml><?xml version="1.0" encoding="utf-8"?>
+<file path=ppt/slides/slide17.xml><?xml version="1.0" encoding="utf-8"?>
 <p:sld xmlns:a="http://schemas.openxmlformats.org/drawingml/2006/main" xmlns:r="http://schemas.openxmlformats.org/officeDocument/2006/relationships" xmlns:p="http://schemas.openxmlformats.org/presentationml/2006/main">
   <p:cSld>
     <p:spTree>
@@ -31717,7 +31597,7 @@
 </p:sld>
 </file>
 
-<file path=ppt/slides/slide19.xml><?xml version="1.0" encoding="utf-8"?>
+<file path=ppt/slides/slide18.xml><?xml version="1.0" encoding="utf-8"?>
 <p:sld xmlns:a="http://schemas.openxmlformats.org/drawingml/2006/main" xmlns:r="http://schemas.openxmlformats.org/officeDocument/2006/relationships" xmlns:p="http://schemas.openxmlformats.org/presentationml/2006/main">
   <p:cSld>
     <p:spTree>
@@ -32104,6 +31984,408 @@
     <p:extLst>
       <p:ext uri="{BB962C8B-B14F-4D97-AF65-F5344CB8AC3E}">
         <p14:creationId xmlns:p14="http://schemas.microsoft.com/office/powerpoint/2010/main" val="2271922660"/>
+      </p:ext>
+    </p:extLst>
+  </p:cSld>
+  <p:clrMapOvr>
+    <a:masterClrMapping/>
+  </p:clrMapOvr>
+</p:sld>
+</file>
+
+<file path=ppt/slides/slide19.xml><?xml version="1.0" encoding="utf-8"?>
+<p:sld xmlns:a="http://schemas.openxmlformats.org/drawingml/2006/main" xmlns:r="http://schemas.openxmlformats.org/officeDocument/2006/relationships" xmlns:p="http://schemas.openxmlformats.org/presentationml/2006/main">
+  <p:cSld>
+    <p:spTree>
+      <p:nvGrpSpPr>
+        <p:cNvPr id="1" name="Shape 278"/>
+        <p:cNvGrpSpPr/>
+        <p:nvPr/>
+      </p:nvGrpSpPr>
+      <p:grpSpPr>
+        <a:xfrm>
+          <a:off x="0" y="0"/>
+          <a:ext cx="0" cy="0"/>
+          <a:chOff x="0" y="0"/>
+          <a:chExt cx="0" cy="0"/>
+        </a:xfrm>
+      </p:grpSpPr>
+      <p:sp>
+        <p:nvSpPr>
+          <p:cNvPr id="279" name="Google Shape;279;p35"/>
+          <p:cNvSpPr txBox="1">
+            <a:spLocks noGrp="1"/>
+          </p:cNvSpPr>
+          <p:nvPr>
+            <p:ph type="title"/>
+          </p:nvPr>
+        </p:nvSpPr>
+        <p:spPr>
+          <a:xfrm>
+            <a:off x="614038" y="341704"/>
+            <a:ext cx="7007400" cy="572700"/>
+          </a:xfrm>
+          <a:prstGeom prst="rect">
+            <a:avLst/>
+          </a:prstGeom>
+        </p:spPr>
+        <p:txBody>
+          <a:bodyPr spcFirstLastPara="1" wrap="square" lIns="91425" tIns="91425" rIns="91425" bIns="91425" anchor="t" anchorCtr="0">
+            <a:noAutofit/>
+          </a:bodyPr>
+          <a:lstStyle/>
+          <a:p>
+            <a:pPr lvl="0" algn="l"/>
+            <a:r>
+              <a:rPr lang="en-US" dirty="0"/>
+              <a:t>References</a:t>
+            </a:r>
+            <a:endParaRPr dirty="0"/>
+          </a:p>
+        </p:txBody>
+      </p:sp>
+      <p:sp>
+        <p:nvSpPr>
+          <p:cNvPr id="21" name="Google Shape;291;p35">
+            <a:extLst>
+              <a:ext uri="{FF2B5EF4-FFF2-40B4-BE49-F238E27FC236}">
+                <a16:creationId xmlns:a16="http://schemas.microsoft.com/office/drawing/2014/main" id="{C2B93451-351A-42E9-BDB8-9BB0F8056FD9}"/>
+              </a:ext>
+            </a:extLst>
+          </p:cNvPr>
+          <p:cNvSpPr txBox="1">
+            <a:spLocks/>
+          </p:cNvSpPr>
+          <p:nvPr/>
+        </p:nvSpPr>
+        <p:spPr>
+          <a:xfrm>
+            <a:off x="614038" y="1335588"/>
+            <a:ext cx="7007400" cy="2293659"/>
+          </a:xfrm>
+          <a:prstGeom prst="rect">
+            <a:avLst/>
+          </a:prstGeom>
+          <a:noFill/>
+          <a:ln>
+            <a:noFill/>
+          </a:ln>
+        </p:spPr>
+        <p:txBody>
+          <a:bodyPr spcFirstLastPara="1" wrap="square" lIns="91425" tIns="91425" rIns="91425" bIns="91425" anchor="t" anchorCtr="0">
+            <a:noAutofit/>
+          </a:bodyPr>
+          <a:lstStyle>
+            <a:defPPr marR="0" lvl="0" algn="l" rtl="0">
+              <a:lnSpc>
+                <a:spcPct val="100000"/>
+              </a:lnSpc>
+              <a:spcBef>
+                <a:spcPts val="0"/>
+              </a:spcBef>
+              <a:spcAft>
+                <a:spcPts val="0"/>
+              </a:spcAft>
+            </a:defPPr>
+            <a:lvl1pPr marL="457200" marR="0" lvl="0" indent="-342900" algn="l" rtl="0">
+              <a:lnSpc>
+                <a:spcPct val="100000"/>
+              </a:lnSpc>
+              <a:spcBef>
+                <a:spcPts val="0"/>
+              </a:spcBef>
+              <a:spcAft>
+                <a:spcPts val="0"/>
+              </a:spcAft>
+              <a:buClr>
+                <a:schemeClr val="dk1"/>
+              </a:buClr>
+              <a:buSzPts val="1800"/>
+              <a:buFont typeface="Didact Gothic"/>
+              <a:buChar char="●"/>
+              <a:defRPr sz="1800" b="0" i="0" u="none" strike="noStrike" cap="none">
+                <a:solidFill>
+                  <a:schemeClr val="dk1"/>
+                </a:solidFill>
+                <a:latin typeface="Didact Gothic"/>
+                <a:ea typeface="Didact Gothic"/>
+                <a:cs typeface="Didact Gothic"/>
+                <a:sym typeface="Didact Gothic"/>
+              </a:defRPr>
+            </a:lvl1pPr>
+            <a:lvl2pPr marL="914400" marR="0" lvl="1" indent="-317500" algn="l" rtl="0">
+              <a:lnSpc>
+                <a:spcPct val="100000"/>
+              </a:lnSpc>
+              <a:spcBef>
+                <a:spcPts val="1600"/>
+              </a:spcBef>
+              <a:spcAft>
+                <a:spcPts val="0"/>
+              </a:spcAft>
+              <a:buClr>
+                <a:schemeClr val="dk1"/>
+              </a:buClr>
+              <a:buSzPts val="1400"/>
+              <a:buFont typeface="Didact Gothic"/>
+              <a:buChar char="○"/>
+              <a:defRPr sz="1400" b="0" i="0" u="none" strike="noStrike" cap="none">
+                <a:solidFill>
+                  <a:schemeClr val="dk1"/>
+                </a:solidFill>
+                <a:latin typeface="Didact Gothic"/>
+                <a:ea typeface="Didact Gothic"/>
+                <a:cs typeface="Didact Gothic"/>
+                <a:sym typeface="Didact Gothic"/>
+              </a:defRPr>
+            </a:lvl2pPr>
+            <a:lvl3pPr marL="1371600" marR="0" lvl="2" indent="-317500" algn="l" rtl="0">
+              <a:lnSpc>
+                <a:spcPct val="100000"/>
+              </a:lnSpc>
+              <a:spcBef>
+                <a:spcPts val="1600"/>
+              </a:spcBef>
+              <a:spcAft>
+                <a:spcPts val="0"/>
+              </a:spcAft>
+              <a:buClr>
+                <a:schemeClr val="dk1"/>
+              </a:buClr>
+              <a:buSzPts val="1400"/>
+              <a:buFont typeface="Didact Gothic"/>
+              <a:buChar char="■"/>
+              <a:defRPr sz="1400" b="0" i="0" u="none" strike="noStrike" cap="none">
+                <a:solidFill>
+                  <a:schemeClr val="dk1"/>
+                </a:solidFill>
+                <a:latin typeface="Didact Gothic"/>
+                <a:ea typeface="Didact Gothic"/>
+                <a:cs typeface="Didact Gothic"/>
+                <a:sym typeface="Didact Gothic"/>
+              </a:defRPr>
+            </a:lvl3pPr>
+            <a:lvl4pPr marL="1828800" marR="0" lvl="3" indent="-317500" algn="l" rtl="0">
+              <a:lnSpc>
+                <a:spcPct val="100000"/>
+              </a:lnSpc>
+              <a:spcBef>
+                <a:spcPts val="1600"/>
+              </a:spcBef>
+              <a:spcAft>
+                <a:spcPts val="0"/>
+              </a:spcAft>
+              <a:buClr>
+                <a:schemeClr val="dk1"/>
+              </a:buClr>
+              <a:buSzPts val="1400"/>
+              <a:buFont typeface="Didact Gothic"/>
+              <a:buChar char="●"/>
+              <a:defRPr sz="1400" b="0" i="0" u="none" strike="noStrike" cap="none">
+                <a:solidFill>
+                  <a:schemeClr val="dk1"/>
+                </a:solidFill>
+                <a:latin typeface="Didact Gothic"/>
+                <a:ea typeface="Didact Gothic"/>
+                <a:cs typeface="Didact Gothic"/>
+                <a:sym typeface="Didact Gothic"/>
+              </a:defRPr>
+            </a:lvl4pPr>
+            <a:lvl5pPr marL="2286000" marR="0" lvl="4" indent="-317500" algn="l" rtl="0">
+              <a:lnSpc>
+                <a:spcPct val="100000"/>
+              </a:lnSpc>
+              <a:spcBef>
+                <a:spcPts val="1600"/>
+              </a:spcBef>
+              <a:spcAft>
+                <a:spcPts val="0"/>
+              </a:spcAft>
+              <a:buClr>
+                <a:schemeClr val="dk1"/>
+              </a:buClr>
+              <a:buSzPts val="1400"/>
+              <a:buFont typeface="Didact Gothic"/>
+              <a:buChar char="○"/>
+              <a:defRPr sz="1400" b="0" i="0" u="none" strike="noStrike" cap="none">
+                <a:solidFill>
+                  <a:schemeClr val="dk1"/>
+                </a:solidFill>
+                <a:latin typeface="Didact Gothic"/>
+                <a:ea typeface="Didact Gothic"/>
+                <a:cs typeface="Didact Gothic"/>
+                <a:sym typeface="Didact Gothic"/>
+              </a:defRPr>
+            </a:lvl5pPr>
+            <a:lvl6pPr marL="2743200" marR="0" lvl="5" indent="-317500" algn="l" rtl="0">
+              <a:lnSpc>
+                <a:spcPct val="100000"/>
+              </a:lnSpc>
+              <a:spcBef>
+                <a:spcPts val="1600"/>
+              </a:spcBef>
+              <a:spcAft>
+                <a:spcPts val="0"/>
+              </a:spcAft>
+              <a:buClr>
+                <a:schemeClr val="dk1"/>
+              </a:buClr>
+              <a:buSzPts val="1400"/>
+              <a:buFont typeface="Didact Gothic"/>
+              <a:buChar char="■"/>
+              <a:defRPr sz="1400" b="0" i="0" u="none" strike="noStrike" cap="none">
+                <a:solidFill>
+                  <a:schemeClr val="dk1"/>
+                </a:solidFill>
+                <a:latin typeface="Didact Gothic"/>
+                <a:ea typeface="Didact Gothic"/>
+                <a:cs typeface="Didact Gothic"/>
+                <a:sym typeface="Didact Gothic"/>
+              </a:defRPr>
+            </a:lvl6pPr>
+            <a:lvl7pPr marL="3200400" marR="0" lvl="6" indent="-317500" algn="l" rtl="0">
+              <a:lnSpc>
+                <a:spcPct val="100000"/>
+              </a:lnSpc>
+              <a:spcBef>
+                <a:spcPts val="1600"/>
+              </a:spcBef>
+              <a:spcAft>
+                <a:spcPts val="0"/>
+              </a:spcAft>
+              <a:buClr>
+                <a:schemeClr val="dk1"/>
+              </a:buClr>
+              <a:buSzPts val="1400"/>
+              <a:buFont typeface="Didact Gothic"/>
+              <a:buChar char="●"/>
+              <a:defRPr sz="1400" b="0" i="0" u="none" strike="noStrike" cap="none">
+                <a:solidFill>
+                  <a:schemeClr val="dk1"/>
+                </a:solidFill>
+                <a:latin typeface="Didact Gothic"/>
+                <a:ea typeface="Didact Gothic"/>
+                <a:cs typeface="Didact Gothic"/>
+                <a:sym typeface="Didact Gothic"/>
+              </a:defRPr>
+            </a:lvl7pPr>
+            <a:lvl8pPr marL="3657600" marR="0" lvl="7" indent="-317500" algn="l" rtl="0">
+              <a:lnSpc>
+                <a:spcPct val="100000"/>
+              </a:lnSpc>
+              <a:spcBef>
+                <a:spcPts val="1600"/>
+              </a:spcBef>
+              <a:spcAft>
+                <a:spcPts val="0"/>
+              </a:spcAft>
+              <a:buClr>
+                <a:schemeClr val="dk1"/>
+              </a:buClr>
+              <a:buSzPts val="1400"/>
+              <a:buFont typeface="Didact Gothic"/>
+              <a:buChar char="○"/>
+              <a:defRPr sz="1400" b="0" i="0" u="none" strike="noStrike" cap="none">
+                <a:solidFill>
+                  <a:schemeClr val="dk1"/>
+                </a:solidFill>
+                <a:latin typeface="Didact Gothic"/>
+                <a:ea typeface="Didact Gothic"/>
+                <a:cs typeface="Didact Gothic"/>
+                <a:sym typeface="Didact Gothic"/>
+              </a:defRPr>
+            </a:lvl8pPr>
+            <a:lvl9pPr marL="4114800" marR="0" lvl="8" indent="-317500" algn="l" rtl="0">
+              <a:lnSpc>
+                <a:spcPct val="100000"/>
+              </a:lnSpc>
+              <a:spcBef>
+                <a:spcPts val="1600"/>
+              </a:spcBef>
+              <a:spcAft>
+                <a:spcPts val="1600"/>
+              </a:spcAft>
+              <a:buClr>
+                <a:schemeClr val="dk1"/>
+              </a:buClr>
+              <a:buSzPts val="1400"/>
+              <a:buFont typeface="Didact Gothic"/>
+              <a:buChar char="■"/>
+              <a:defRPr sz="1400" b="0" i="0" u="none" strike="noStrike" cap="none">
+                <a:solidFill>
+                  <a:schemeClr val="dk1"/>
+                </a:solidFill>
+                <a:latin typeface="Didact Gothic"/>
+                <a:ea typeface="Didact Gothic"/>
+                <a:cs typeface="Didact Gothic"/>
+                <a:sym typeface="Didact Gothic"/>
+              </a:defRPr>
+            </a:lvl9pPr>
+          </a:lstStyle>
+          <a:p>
+            <a:pPr marL="285750" indent="-285750">
+              <a:spcAft>
+                <a:spcPts val="1600"/>
+              </a:spcAft>
+              <a:buFont typeface="Wingdings" panose="05000000000000000000" pitchFamily="2" charset="2"/>
+              <a:buChar char="§"/>
+            </a:pPr>
+            <a:r>
+              <a:rPr lang="en-US" sz="1200" b="1" dirty="0"/>
+              <a:t>AD8232 Sensor Datasheet</a:t>
+            </a:r>
+          </a:p>
+          <a:p>
+            <a:pPr marL="285750" indent="-285750">
+              <a:spcAft>
+                <a:spcPts val="1600"/>
+              </a:spcAft>
+              <a:buFont typeface="Wingdings" panose="05000000000000000000" pitchFamily="2" charset="2"/>
+              <a:buChar char="§"/>
+            </a:pPr>
+            <a:r>
+              <a:rPr lang="en-US" sz="1200" b="1" dirty="0"/>
+              <a:t>STM32F1 Datasheet</a:t>
+            </a:r>
+          </a:p>
+          <a:p>
+            <a:pPr marL="285750" indent="-285750">
+              <a:spcAft>
+                <a:spcPts val="1600"/>
+              </a:spcAft>
+              <a:buFont typeface="Wingdings" panose="05000000000000000000" pitchFamily="2" charset="2"/>
+              <a:buChar char="§"/>
+            </a:pPr>
+            <a:r>
+              <a:rPr lang="en-US" sz="1200" dirty="0">
+                <a:hlinkClick r:id="rId3"/>
+              </a:rPr>
+              <a:t>https://learn.sparkfun.com/tutorials/graph-sensor-data-with-python-and-matplotlib/update-a-graph-in-real-time</a:t>
+            </a:r>
+            <a:endParaRPr lang="en-US" sz="1200" dirty="0"/>
+          </a:p>
+          <a:p>
+            <a:pPr marL="285750" indent="-285750">
+              <a:spcAft>
+                <a:spcPts val="1600"/>
+              </a:spcAft>
+              <a:buFont typeface="Wingdings" panose="05000000000000000000" pitchFamily="2" charset="2"/>
+              <a:buChar char="§"/>
+            </a:pPr>
+            <a:r>
+              <a:rPr lang="en-US" sz="1200" dirty="0">
+                <a:hlinkClick r:id="rId4"/>
+              </a:rPr>
+              <a:t>https://pythonhosted.org/pyserial/index.html</a:t>
+            </a:r>
+            <a:endParaRPr lang="en-US" sz="1200" b="1" dirty="0"/>
+          </a:p>
+        </p:txBody>
+      </p:sp>
+    </p:spTree>
+    <p:extLst>
+      <p:ext uri="{BB962C8B-B14F-4D97-AF65-F5344CB8AC3E}">
+        <p14:creationId xmlns:p14="http://schemas.microsoft.com/office/powerpoint/2010/main" val="31805514"/>
       </p:ext>
     </p:extLst>
   </p:cSld>
@@ -33590,409 +33872,7 @@
         </p:nvSpPr>
         <p:spPr>
           <a:xfrm>
-            <a:off x="614038" y="341704"/>
-            <a:ext cx="7007400" cy="572700"/>
-          </a:xfrm>
-          <a:prstGeom prst="rect">
-            <a:avLst/>
-          </a:prstGeom>
-        </p:spPr>
-        <p:txBody>
-          <a:bodyPr spcFirstLastPara="1" wrap="square" lIns="91425" tIns="91425" rIns="91425" bIns="91425" anchor="t" anchorCtr="0">
-            <a:noAutofit/>
-          </a:bodyPr>
-          <a:lstStyle/>
-          <a:p>
-            <a:pPr lvl="0" algn="l"/>
-            <a:r>
-              <a:rPr lang="en-US" dirty="0"/>
-              <a:t>References</a:t>
-            </a:r>
-            <a:endParaRPr dirty="0"/>
-          </a:p>
-        </p:txBody>
-      </p:sp>
-      <p:sp>
-        <p:nvSpPr>
-          <p:cNvPr id="21" name="Google Shape;291;p35">
-            <a:extLst>
-              <a:ext uri="{FF2B5EF4-FFF2-40B4-BE49-F238E27FC236}">
-                <a16:creationId xmlns:a16="http://schemas.microsoft.com/office/drawing/2014/main" id="{C2B93451-351A-42E9-BDB8-9BB0F8056FD9}"/>
-              </a:ext>
-            </a:extLst>
-          </p:cNvPr>
-          <p:cNvSpPr txBox="1">
-            <a:spLocks/>
-          </p:cNvSpPr>
-          <p:nvPr/>
-        </p:nvSpPr>
-        <p:spPr>
-          <a:xfrm>
-            <a:off x="614038" y="1335588"/>
-            <a:ext cx="7007400" cy="2293659"/>
-          </a:xfrm>
-          <a:prstGeom prst="rect">
-            <a:avLst/>
-          </a:prstGeom>
-          <a:noFill/>
-          <a:ln>
-            <a:noFill/>
-          </a:ln>
-        </p:spPr>
-        <p:txBody>
-          <a:bodyPr spcFirstLastPara="1" wrap="square" lIns="91425" tIns="91425" rIns="91425" bIns="91425" anchor="t" anchorCtr="0">
-            <a:noAutofit/>
-          </a:bodyPr>
-          <a:lstStyle>
-            <a:defPPr marR="0" lvl="0" algn="l" rtl="0">
-              <a:lnSpc>
-                <a:spcPct val="100000"/>
-              </a:lnSpc>
-              <a:spcBef>
-                <a:spcPts val="0"/>
-              </a:spcBef>
-              <a:spcAft>
-                <a:spcPts val="0"/>
-              </a:spcAft>
-            </a:defPPr>
-            <a:lvl1pPr marL="457200" marR="0" lvl="0" indent="-342900" algn="l" rtl="0">
-              <a:lnSpc>
-                <a:spcPct val="100000"/>
-              </a:lnSpc>
-              <a:spcBef>
-                <a:spcPts val="0"/>
-              </a:spcBef>
-              <a:spcAft>
-                <a:spcPts val="0"/>
-              </a:spcAft>
-              <a:buClr>
-                <a:schemeClr val="dk1"/>
-              </a:buClr>
-              <a:buSzPts val="1800"/>
-              <a:buFont typeface="Didact Gothic"/>
-              <a:buChar char="●"/>
-              <a:defRPr sz="1800" b="0" i="0" u="none" strike="noStrike" cap="none">
-                <a:solidFill>
-                  <a:schemeClr val="dk1"/>
-                </a:solidFill>
-                <a:latin typeface="Didact Gothic"/>
-                <a:ea typeface="Didact Gothic"/>
-                <a:cs typeface="Didact Gothic"/>
-                <a:sym typeface="Didact Gothic"/>
-              </a:defRPr>
-            </a:lvl1pPr>
-            <a:lvl2pPr marL="914400" marR="0" lvl="1" indent="-317500" algn="l" rtl="0">
-              <a:lnSpc>
-                <a:spcPct val="100000"/>
-              </a:lnSpc>
-              <a:spcBef>
-                <a:spcPts val="1600"/>
-              </a:spcBef>
-              <a:spcAft>
-                <a:spcPts val="0"/>
-              </a:spcAft>
-              <a:buClr>
-                <a:schemeClr val="dk1"/>
-              </a:buClr>
-              <a:buSzPts val="1400"/>
-              <a:buFont typeface="Didact Gothic"/>
-              <a:buChar char="○"/>
-              <a:defRPr sz="1400" b="0" i="0" u="none" strike="noStrike" cap="none">
-                <a:solidFill>
-                  <a:schemeClr val="dk1"/>
-                </a:solidFill>
-                <a:latin typeface="Didact Gothic"/>
-                <a:ea typeface="Didact Gothic"/>
-                <a:cs typeface="Didact Gothic"/>
-                <a:sym typeface="Didact Gothic"/>
-              </a:defRPr>
-            </a:lvl2pPr>
-            <a:lvl3pPr marL="1371600" marR="0" lvl="2" indent="-317500" algn="l" rtl="0">
-              <a:lnSpc>
-                <a:spcPct val="100000"/>
-              </a:lnSpc>
-              <a:spcBef>
-                <a:spcPts val="1600"/>
-              </a:spcBef>
-              <a:spcAft>
-                <a:spcPts val="0"/>
-              </a:spcAft>
-              <a:buClr>
-                <a:schemeClr val="dk1"/>
-              </a:buClr>
-              <a:buSzPts val="1400"/>
-              <a:buFont typeface="Didact Gothic"/>
-              <a:buChar char="■"/>
-              <a:defRPr sz="1400" b="0" i="0" u="none" strike="noStrike" cap="none">
-                <a:solidFill>
-                  <a:schemeClr val="dk1"/>
-                </a:solidFill>
-                <a:latin typeface="Didact Gothic"/>
-                <a:ea typeface="Didact Gothic"/>
-                <a:cs typeface="Didact Gothic"/>
-                <a:sym typeface="Didact Gothic"/>
-              </a:defRPr>
-            </a:lvl3pPr>
-            <a:lvl4pPr marL="1828800" marR="0" lvl="3" indent="-317500" algn="l" rtl="0">
-              <a:lnSpc>
-                <a:spcPct val="100000"/>
-              </a:lnSpc>
-              <a:spcBef>
-                <a:spcPts val="1600"/>
-              </a:spcBef>
-              <a:spcAft>
-                <a:spcPts val="0"/>
-              </a:spcAft>
-              <a:buClr>
-                <a:schemeClr val="dk1"/>
-              </a:buClr>
-              <a:buSzPts val="1400"/>
-              <a:buFont typeface="Didact Gothic"/>
-              <a:buChar char="●"/>
-              <a:defRPr sz="1400" b="0" i="0" u="none" strike="noStrike" cap="none">
-                <a:solidFill>
-                  <a:schemeClr val="dk1"/>
-                </a:solidFill>
-                <a:latin typeface="Didact Gothic"/>
-                <a:ea typeface="Didact Gothic"/>
-                <a:cs typeface="Didact Gothic"/>
-                <a:sym typeface="Didact Gothic"/>
-              </a:defRPr>
-            </a:lvl4pPr>
-            <a:lvl5pPr marL="2286000" marR="0" lvl="4" indent="-317500" algn="l" rtl="0">
-              <a:lnSpc>
-                <a:spcPct val="100000"/>
-              </a:lnSpc>
-              <a:spcBef>
-                <a:spcPts val="1600"/>
-              </a:spcBef>
-              <a:spcAft>
-                <a:spcPts val="0"/>
-              </a:spcAft>
-              <a:buClr>
-                <a:schemeClr val="dk1"/>
-              </a:buClr>
-              <a:buSzPts val="1400"/>
-              <a:buFont typeface="Didact Gothic"/>
-              <a:buChar char="○"/>
-              <a:defRPr sz="1400" b="0" i="0" u="none" strike="noStrike" cap="none">
-                <a:solidFill>
-                  <a:schemeClr val="dk1"/>
-                </a:solidFill>
-                <a:latin typeface="Didact Gothic"/>
-                <a:ea typeface="Didact Gothic"/>
-                <a:cs typeface="Didact Gothic"/>
-                <a:sym typeface="Didact Gothic"/>
-              </a:defRPr>
-            </a:lvl5pPr>
-            <a:lvl6pPr marL="2743200" marR="0" lvl="5" indent="-317500" algn="l" rtl="0">
-              <a:lnSpc>
-                <a:spcPct val="100000"/>
-              </a:lnSpc>
-              <a:spcBef>
-                <a:spcPts val="1600"/>
-              </a:spcBef>
-              <a:spcAft>
-                <a:spcPts val="0"/>
-              </a:spcAft>
-              <a:buClr>
-                <a:schemeClr val="dk1"/>
-              </a:buClr>
-              <a:buSzPts val="1400"/>
-              <a:buFont typeface="Didact Gothic"/>
-              <a:buChar char="■"/>
-              <a:defRPr sz="1400" b="0" i="0" u="none" strike="noStrike" cap="none">
-                <a:solidFill>
-                  <a:schemeClr val="dk1"/>
-                </a:solidFill>
-                <a:latin typeface="Didact Gothic"/>
-                <a:ea typeface="Didact Gothic"/>
-                <a:cs typeface="Didact Gothic"/>
-                <a:sym typeface="Didact Gothic"/>
-              </a:defRPr>
-            </a:lvl6pPr>
-            <a:lvl7pPr marL="3200400" marR="0" lvl="6" indent="-317500" algn="l" rtl="0">
-              <a:lnSpc>
-                <a:spcPct val="100000"/>
-              </a:lnSpc>
-              <a:spcBef>
-                <a:spcPts val="1600"/>
-              </a:spcBef>
-              <a:spcAft>
-                <a:spcPts val="0"/>
-              </a:spcAft>
-              <a:buClr>
-                <a:schemeClr val="dk1"/>
-              </a:buClr>
-              <a:buSzPts val="1400"/>
-              <a:buFont typeface="Didact Gothic"/>
-              <a:buChar char="●"/>
-              <a:defRPr sz="1400" b="0" i="0" u="none" strike="noStrike" cap="none">
-                <a:solidFill>
-                  <a:schemeClr val="dk1"/>
-                </a:solidFill>
-                <a:latin typeface="Didact Gothic"/>
-                <a:ea typeface="Didact Gothic"/>
-                <a:cs typeface="Didact Gothic"/>
-                <a:sym typeface="Didact Gothic"/>
-              </a:defRPr>
-            </a:lvl7pPr>
-            <a:lvl8pPr marL="3657600" marR="0" lvl="7" indent="-317500" algn="l" rtl="0">
-              <a:lnSpc>
-                <a:spcPct val="100000"/>
-              </a:lnSpc>
-              <a:spcBef>
-                <a:spcPts val="1600"/>
-              </a:spcBef>
-              <a:spcAft>
-                <a:spcPts val="0"/>
-              </a:spcAft>
-              <a:buClr>
-                <a:schemeClr val="dk1"/>
-              </a:buClr>
-              <a:buSzPts val="1400"/>
-              <a:buFont typeface="Didact Gothic"/>
-              <a:buChar char="○"/>
-              <a:defRPr sz="1400" b="0" i="0" u="none" strike="noStrike" cap="none">
-                <a:solidFill>
-                  <a:schemeClr val="dk1"/>
-                </a:solidFill>
-                <a:latin typeface="Didact Gothic"/>
-                <a:ea typeface="Didact Gothic"/>
-                <a:cs typeface="Didact Gothic"/>
-                <a:sym typeface="Didact Gothic"/>
-              </a:defRPr>
-            </a:lvl8pPr>
-            <a:lvl9pPr marL="4114800" marR="0" lvl="8" indent="-317500" algn="l" rtl="0">
-              <a:lnSpc>
-                <a:spcPct val="100000"/>
-              </a:lnSpc>
-              <a:spcBef>
-                <a:spcPts val="1600"/>
-              </a:spcBef>
-              <a:spcAft>
-                <a:spcPts val="1600"/>
-              </a:spcAft>
-              <a:buClr>
-                <a:schemeClr val="dk1"/>
-              </a:buClr>
-              <a:buSzPts val="1400"/>
-              <a:buFont typeface="Didact Gothic"/>
-              <a:buChar char="■"/>
-              <a:defRPr sz="1400" b="0" i="0" u="none" strike="noStrike" cap="none">
-                <a:solidFill>
-                  <a:schemeClr val="dk1"/>
-                </a:solidFill>
-                <a:latin typeface="Didact Gothic"/>
-                <a:ea typeface="Didact Gothic"/>
-                <a:cs typeface="Didact Gothic"/>
-                <a:sym typeface="Didact Gothic"/>
-              </a:defRPr>
-            </a:lvl9pPr>
-          </a:lstStyle>
-          <a:p>
-            <a:pPr marL="285750" indent="-285750">
-              <a:spcAft>
-                <a:spcPts val="1600"/>
-              </a:spcAft>
-              <a:buFont typeface="Wingdings" panose="05000000000000000000" pitchFamily="2" charset="2"/>
-              <a:buChar char="§"/>
-            </a:pPr>
-            <a:r>
-              <a:rPr lang="en-US" sz="1200" b="1" dirty="0"/>
-              <a:t>AD8232 Sensor Datasheet</a:t>
-            </a:r>
-          </a:p>
-          <a:p>
-            <a:pPr marL="285750" indent="-285750">
-              <a:spcAft>
-                <a:spcPts val="1600"/>
-              </a:spcAft>
-              <a:buFont typeface="Wingdings" panose="05000000000000000000" pitchFamily="2" charset="2"/>
-              <a:buChar char="§"/>
-            </a:pPr>
-            <a:r>
-              <a:rPr lang="en-US" sz="1200" b="1" dirty="0"/>
-              <a:t>STM32F1 Datasheet</a:t>
-            </a:r>
-          </a:p>
-          <a:p>
-            <a:pPr marL="285750" indent="-285750">
-              <a:spcAft>
-                <a:spcPts val="1600"/>
-              </a:spcAft>
-              <a:buFont typeface="Wingdings" panose="05000000000000000000" pitchFamily="2" charset="2"/>
-              <a:buChar char="§"/>
-            </a:pPr>
-            <a:r>
-              <a:rPr lang="en-US" sz="1200" dirty="0">
-                <a:hlinkClick r:id="rId3"/>
-              </a:rPr>
-              <a:t>https://learn.sparkfun.com/tutorials/graph-sensor-data-with-python-and-matplotlib/update-a-graph-in-real-time</a:t>
-            </a:r>
-            <a:endParaRPr lang="en-US" sz="1200" dirty="0"/>
-          </a:p>
-          <a:p>
-            <a:pPr marL="285750" indent="-285750">
-              <a:spcAft>
-                <a:spcPts val="1600"/>
-              </a:spcAft>
-              <a:buFont typeface="Wingdings" panose="05000000000000000000" pitchFamily="2" charset="2"/>
-              <a:buChar char="§"/>
-            </a:pPr>
-            <a:r>
-              <a:rPr lang="en-US" sz="1200" dirty="0">
-                <a:hlinkClick r:id="rId4"/>
-              </a:rPr>
-              <a:t>https://pythonhosted.org/pyserial/index.html</a:t>
-            </a:r>
-            <a:endParaRPr lang="en-US" sz="1200" b="1" dirty="0"/>
-          </a:p>
-        </p:txBody>
-      </p:sp>
-    </p:spTree>
-    <p:extLst>
-      <p:ext uri="{BB962C8B-B14F-4D97-AF65-F5344CB8AC3E}">
-        <p14:creationId xmlns:p14="http://schemas.microsoft.com/office/powerpoint/2010/main" val="31805514"/>
-      </p:ext>
-    </p:extLst>
-  </p:cSld>
-  <p:clrMapOvr>
-    <a:masterClrMapping/>
-  </p:clrMapOvr>
-</p:sld>
-</file>
-
-<file path=ppt/slides/slide21.xml><?xml version="1.0" encoding="utf-8"?>
-<p:sld xmlns:a="http://schemas.openxmlformats.org/drawingml/2006/main" xmlns:r="http://schemas.openxmlformats.org/officeDocument/2006/relationships" xmlns:p="http://schemas.openxmlformats.org/presentationml/2006/main">
-  <p:cSld>
-    <p:spTree>
-      <p:nvGrpSpPr>
-        <p:cNvPr id="1" name="Shape 278"/>
-        <p:cNvGrpSpPr/>
-        <p:nvPr/>
-      </p:nvGrpSpPr>
-      <p:grpSpPr>
-        <a:xfrm>
-          <a:off x="0" y="0"/>
-          <a:ext cx="0" cy="0"/>
-          <a:chOff x="0" y="0"/>
-          <a:chExt cx="0" cy="0"/>
-        </a:xfrm>
-      </p:grpSpPr>
-      <p:sp>
-        <p:nvSpPr>
-          <p:cNvPr id="279" name="Google Shape;279;p35"/>
-          <p:cNvSpPr txBox="1">
-            <a:spLocks noGrp="1"/>
-          </p:cNvSpPr>
-          <p:nvPr>
-            <p:ph type="title"/>
-          </p:nvPr>
-        </p:nvSpPr>
-        <p:spPr>
-          <a:xfrm>
-            <a:off x="748117" y="2571750"/>
+            <a:off x="1003295" y="2571750"/>
             <a:ext cx="7007400" cy="1013509"/>
           </a:xfrm>
           <a:prstGeom prst="rect">
@@ -34028,7 +33908,7 @@
         </p:nvGrpSpPr>
         <p:grpSpPr>
           <a:xfrm>
-            <a:off x="3468218" y="856254"/>
+            <a:off x="3723396" y="856254"/>
             <a:ext cx="1259726" cy="1390760"/>
             <a:chOff x="1512200" y="238125"/>
             <a:chExt cx="4504600" cy="5237625"/>

</xml_diff>